<commit_message>
Updated to the latest version
</commit_message>
<xml_diff>
--- a/Introduction to Machine Learning.pptx
+++ b/Introduction to Machine Learning.pptx
@@ -222,7 +222,7 @@
           <a:p>
             <a:fld id="{CB5F933A-5590-4DA8-96B9-0A49C6754116}" type="datetimeFigureOut">
               <a:rPr lang="en-MY" smtClean="0"/>
-              <a:t>12/6/2020</a:t>
+              <a:t>13/6/2020</a:t>
             </a:fld>
             <a:endParaRPr lang="en-MY"/>
           </a:p>
@@ -1296,7 +1296,7 @@
           <a:p>
             <a:fld id="{D57336B1-66B2-409B-8415-663FE0FBAF46}" type="datetimeFigureOut">
               <a:rPr lang="en-MY" smtClean="0"/>
-              <a:t>12/6/2020</a:t>
+              <a:t>13/6/2020</a:t>
             </a:fld>
             <a:endParaRPr lang="en-MY"/>
           </a:p>
@@ -1496,7 +1496,7 @@
           <a:p>
             <a:fld id="{D57336B1-66B2-409B-8415-663FE0FBAF46}" type="datetimeFigureOut">
               <a:rPr lang="en-MY" smtClean="0"/>
-              <a:t>12/6/2020</a:t>
+              <a:t>13/6/2020</a:t>
             </a:fld>
             <a:endParaRPr lang="en-MY"/>
           </a:p>
@@ -1706,7 +1706,7 @@
           <a:p>
             <a:fld id="{D57336B1-66B2-409B-8415-663FE0FBAF46}" type="datetimeFigureOut">
               <a:rPr lang="en-MY" smtClean="0"/>
-              <a:t>12/6/2020</a:t>
+              <a:t>13/6/2020</a:t>
             </a:fld>
             <a:endParaRPr lang="en-MY"/>
           </a:p>
@@ -1906,7 +1906,7 @@
           <a:p>
             <a:fld id="{D57336B1-66B2-409B-8415-663FE0FBAF46}" type="datetimeFigureOut">
               <a:rPr lang="en-MY" smtClean="0"/>
-              <a:t>12/6/2020</a:t>
+              <a:t>13/6/2020</a:t>
             </a:fld>
             <a:endParaRPr lang="en-MY"/>
           </a:p>
@@ -2182,7 +2182,7 @@
           <a:p>
             <a:fld id="{D57336B1-66B2-409B-8415-663FE0FBAF46}" type="datetimeFigureOut">
               <a:rPr lang="en-MY" smtClean="0"/>
-              <a:t>12/6/2020</a:t>
+              <a:t>13/6/2020</a:t>
             </a:fld>
             <a:endParaRPr lang="en-MY"/>
           </a:p>
@@ -2450,7 +2450,7 @@
           <a:p>
             <a:fld id="{D57336B1-66B2-409B-8415-663FE0FBAF46}" type="datetimeFigureOut">
               <a:rPr lang="en-MY" smtClean="0"/>
-              <a:t>12/6/2020</a:t>
+              <a:t>13/6/2020</a:t>
             </a:fld>
             <a:endParaRPr lang="en-MY"/>
           </a:p>
@@ -2865,7 +2865,7 @@
           <a:p>
             <a:fld id="{D57336B1-66B2-409B-8415-663FE0FBAF46}" type="datetimeFigureOut">
               <a:rPr lang="en-MY" smtClean="0"/>
-              <a:t>12/6/2020</a:t>
+              <a:t>13/6/2020</a:t>
             </a:fld>
             <a:endParaRPr lang="en-MY"/>
           </a:p>
@@ -3007,7 +3007,7 @@
           <a:p>
             <a:fld id="{D57336B1-66B2-409B-8415-663FE0FBAF46}" type="datetimeFigureOut">
               <a:rPr lang="en-MY" smtClean="0"/>
-              <a:t>12/6/2020</a:t>
+              <a:t>13/6/2020</a:t>
             </a:fld>
             <a:endParaRPr lang="en-MY"/>
           </a:p>
@@ -3120,7 +3120,7 @@
           <a:p>
             <a:fld id="{D57336B1-66B2-409B-8415-663FE0FBAF46}" type="datetimeFigureOut">
               <a:rPr lang="en-MY" smtClean="0"/>
-              <a:t>12/6/2020</a:t>
+              <a:t>13/6/2020</a:t>
             </a:fld>
             <a:endParaRPr lang="en-MY"/>
           </a:p>
@@ -3433,7 +3433,7 @@
           <a:p>
             <a:fld id="{D57336B1-66B2-409B-8415-663FE0FBAF46}" type="datetimeFigureOut">
               <a:rPr lang="en-MY" smtClean="0"/>
-              <a:t>12/6/2020</a:t>
+              <a:t>13/6/2020</a:t>
             </a:fld>
             <a:endParaRPr lang="en-MY"/>
           </a:p>
@@ -3722,7 +3722,7 @@
           <a:p>
             <a:fld id="{D57336B1-66B2-409B-8415-663FE0FBAF46}" type="datetimeFigureOut">
               <a:rPr lang="en-MY" smtClean="0"/>
-              <a:t>12/6/2020</a:t>
+              <a:t>13/6/2020</a:t>
             </a:fld>
             <a:endParaRPr lang="en-MY"/>
           </a:p>
@@ -3965,7 +3965,7 @@
           <a:p>
             <a:fld id="{D57336B1-66B2-409B-8415-663FE0FBAF46}" type="datetimeFigureOut">
               <a:rPr lang="en-MY" smtClean="0"/>
-              <a:t>12/6/2020</a:t>
+              <a:t>13/6/2020</a:t>
             </a:fld>
             <a:endParaRPr lang="en-MY"/>
           </a:p>
@@ -18654,6 +18654,97 @@
                 </a:solidFill>
               </a:rPr>
               <a:t>Target</a:t>
+            </a:r>
+          </a:p>
+        </p:txBody>
+      </p:sp>
+      <p:sp>
+        <p:nvSpPr>
+          <p:cNvPr id="7" name="Rectangle 6">
+            <a:extLst>
+              <a:ext uri="{FF2B5EF4-FFF2-40B4-BE49-F238E27FC236}">
+                <a16:creationId xmlns:a16="http://schemas.microsoft.com/office/drawing/2014/main" id="{E1EA5985-02E0-49A3-89D2-33CC7248EE39}"/>
+              </a:ext>
+            </a:extLst>
+          </p:cNvPr>
+          <p:cNvSpPr/>
+          <p:nvPr/>
+        </p:nvSpPr>
+        <p:spPr>
+          <a:xfrm rot="16200000">
+            <a:off x="5366067" y="-3822014"/>
+            <a:ext cx="704801" cy="10081374"/>
+          </a:xfrm>
+          <a:prstGeom prst="rect">
+            <a:avLst/>
+          </a:prstGeom>
+          <a:noFill/>
+          <a:ln w="53975">
+            <a:solidFill>
+              <a:srgbClr val="FFC000"/>
+            </a:solidFill>
+          </a:ln>
+        </p:spPr>
+        <p:style>
+          <a:lnRef idx="2">
+            <a:schemeClr val="accent1">
+              <a:shade val="50000"/>
+            </a:schemeClr>
+          </a:lnRef>
+          <a:fillRef idx="1">
+            <a:schemeClr val="accent1"/>
+          </a:fillRef>
+          <a:effectRef idx="0">
+            <a:schemeClr val="accent1"/>
+          </a:effectRef>
+          <a:fontRef idx="minor">
+            <a:schemeClr val="lt1"/>
+          </a:fontRef>
+        </p:style>
+        <p:txBody>
+          <a:bodyPr rtlCol="0" anchor="ctr"/>
+          <a:lstStyle/>
+          <a:p>
+            <a:pPr algn="ctr"/>
+            <a:endParaRPr lang="en-MY"/>
+          </a:p>
+        </p:txBody>
+      </p:sp>
+      <p:sp>
+        <p:nvSpPr>
+          <p:cNvPr id="8" name="TextBox 7">
+            <a:extLst>
+              <a:ext uri="{FF2B5EF4-FFF2-40B4-BE49-F238E27FC236}">
+                <a16:creationId xmlns:a16="http://schemas.microsoft.com/office/drawing/2014/main" id="{1A21A2B2-334F-4940-9AE8-4F428CB2734B}"/>
+              </a:ext>
+            </a:extLst>
+          </p:cNvPr>
+          <p:cNvSpPr txBox="1"/>
+          <p:nvPr/>
+        </p:nvSpPr>
+        <p:spPr>
+          <a:xfrm>
+            <a:off x="5331277" y="433821"/>
+            <a:ext cx="1003736" cy="369332"/>
+          </a:xfrm>
+          <a:prstGeom prst="rect">
+            <a:avLst/>
+          </a:prstGeom>
+          <a:noFill/>
+        </p:spPr>
+        <p:txBody>
+          <a:bodyPr wrap="none" rtlCol="0">
+            <a:spAutoFit/>
+          </a:bodyPr>
+          <a:lstStyle/>
+          <a:p>
+            <a:r>
+              <a:rPr lang="en-MY" b="1" dirty="0">
+                <a:solidFill>
+                  <a:srgbClr val="FFC000"/>
+                </a:solidFill>
+              </a:rPr>
+              <a:t>Features</a:t>
             </a:r>
           </a:p>
         </p:txBody>

</xml_diff>